<commit_message>
update lectures, add pdfs, update lecture links
</commit_message>
<xml_diff>
--- a/assets/lectures/cbw/2023/RNAseq_2023_Template_Widescreen.pptx
+++ b/assets/lectures/cbw/2023/RNAseq_2023_Template_Widescreen.pptx
@@ -291,7 +291,7 @@
       </p15:sldGuideLst>
     </p:ext>
     <p:ext uri="http://customooxmlschemas.google.com/">
-      <go:slidesCustomData xmlns="" xmlns:mc="http://schemas.openxmlformats.org/markup-compatibility/2006" xmlns:mv="urn:schemas-microsoft-com:mac:vml" xmlns:c="http://schemas.openxmlformats.org/drawingml/2006/chart" xmlns:dgm="http://schemas.openxmlformats.org/drawingml/2006/diagram" xmlns:o="urn:schemas-microsoft-com:office:office" xmlns:v="urn:schemas-microsoft-com:vml" xmlns:pvml="urn:schemas-microsoft-com:office:powerpoint" xmlns:com="http://schemas.openxmlformats.org/drawingml/2006/compatibility" xmlns:p14="http://schemas.microsoft.com/office/powerpoint/2010/main" xmlns:p15="http://schemas.microsoft.com/office/powerpoint/2012/main" xmlns:ahyp="http://schemas.microsoft.com/office/drawing/2018/hyperlinkcolor" xmlns:go="http://customooxmlschemas.google.com/" r:id="rId24" roundtripDataSignature="AMtx7mjJUqhzRCG90pmUVeTJ3qvI+i8ayQ=="/>
+      <go:slidesCustomData xmlns:go="http://customooxmlschemas.google.com/" xmlns:ahyp="http://schemas.microsoft.com/office/drawing/2018/hyperlinkcolor" xmlns:p15="http://schemas.microsoft.com/office/powerpoint/2012/main" xmlns:p14="http://schemas.microsoft.com/office/powerpoint/2010/main" xmlns:com="http://schemas.openxmlformats.org/drawingml/2006/compatibility" xmlns:pvml="urn:schemas-microsoft-com:office:powerpoint" xmlns:v="urn:schemas-microsoft-com:vml" xmlns:o="urn:schemas-microsoft-com:office:office" xmlns:dgm="http://schemas.openxmlformats.org/drawingml/2006/diagram" xmlns:c="http://schemas.openxmlformats.org/drawingml/2006/chart" xmlns:mv="urn:schemas-microsoft-com:mac:vml" xmlns:mc="http://schemas.openxmlformats.org/markup-compatibility/2006" xmlns="" r:id="rId24" roundtripDataSignature="AMtx7mjJUqhzRCG90pmUVeTJ3qvI+i8ayQ=="/>
     </p:ext>
   </p:extLst>
 </p:presentation>
@@ -2769,7 +2769,7 @@
           <a:p>
             <a:pPr algn="ctr"/>
             <a:fld id="{663B4470-66D3-704F-8586-E8D8B4F9846D}" type="slidenum">
-              <a:rPr lang="en-US" sz="1800" b="1" smtClean="0">
+              <a:rPr lang="en-US" sz="1800" b="0" smtClean="0">
                 <a:solidFill>
                   <a:schemeClr val="bg1"/>
                 </a:solidFill>
@@ -2777,7 +2777,7 @@
               <a:pPr algn="ctr"/>
               <a:t>‹#›</a:t>
             </a:fld>
-            <a:endParaRPr lang="en-US" sz="1800" b="1" dirty="0">
+            <a:endParaRPr lang="en-US" sz="1800" b="0" dirty="0">
               <a:solidFill>
                 <a:schemeClr val="bg1"/>
               </a:solidFill>
@@ -3206,7 +3206,7 @@
           <a:p>
             <a:pPr algn="ctr"/>
             <a:fld id="{663B4470-66D3-704F-8586-E8D8B4F9846D}" type="slidenum">
-              <a:rPr lang="en-US" sz="1800" b="1" smtClean="0">
+              <a:rPr lang="en-US" sz="1800" b="0" smtClean="0">
                 <a:solidFill>
                   <a:schemeClr val="bg1"/>
                 </a:solidFill>
@@ -3214,7 +3214,7 @@
               <a:pPr algn="ctr"/>
               <a:t>‹#›</a:t>
             </a:fld>
-            <a:endParaRPr lang="en-US" sz="1800" b="1" dirty="0">
+            <a:endParaRPr lang="en-US" sz="1800" b="0" dirty="0">
               <a:solidFill>
                 <a:schemeClr val="bg1"/>
               </a:solidFill>
@@ -3277,7 +3277,7 @@
           <a:p>
             <a:pPr algn="ctr"/>
             <a:fld id="{663B4470-66D3-704F-8586-E8D8B4F9846D}" type="slidenum">
-              <a:rPr lang="en-US" sz="1800" b="1" smtClean="0">
+              <a:rPr lang="en-US" sz="1800" b="0" smtClean="0">
                 <a:solidFill>
                   <a:schemeClr val="bg1"/>
                 </a:solidFill>
@@ -3285,7 +3285,7 @@
               <a:pPr algn="ctr"/>
               <a:t>‹#›</a:t>
             </a:fld>
-            <a:endParaRPr lang="en-US" sz="1800" b="1" dirty="0">
+            <a:endParaRPr lang="en-US" sz="1800" b="0" dirty="0">
               <a:solidFill>
                 <a:schemeClr val="bg1"/>
               </a:solidFill>
@@ -3511,7 +3511,7 @@
           <a:p>
             <a:pPr algn="ctr"/>
             <a:fld id="{663B4470-66D3-704F-8586-E8D8B4F9846D}" type="slidenum">
-              <a:rPr lang="en-US" sz="1800" b="1" smtClean="0">
+              <a:rPr lang="en-US" sz="1800" b="0" smtClean="0">
                 <a:solidFill>
                   <a:schemeClr val="bg1"/>
                 </a:solidFill>
@@ -3519,7 +3519,7 @@
               <a:pPr algn="ctr"/>
               <a:t>‹#›</a:t>
             </a:fld>
-            <a:endParaRPr lang="en-US" sz="1800" b="1" dirty="0">
+            <a:endParaRPr lang="en-US" sz="1800" b="0" dirty="0">
               <a:solidFill>
                 <a:schemeClr val="bg1"/>
               </a:solidFill>
@@ -3969,7 +3969,7 @@
           <a:p>
             <a:pPr algn="ctr"/>
             <a:fld id="{663B4470-66D3-704F-8586-E8D8B4F9846D}" type="slidenum">
-              <a:rPr lang="en-US" sz="1800" b="1" smtClean="0">
+              <a:rPr lang="en-US" sz="1800" b="0" smtClean="0">
                 <a:solidFill>
                   <a:schemeClr val="bg1"/>
                 </a:solidFill>
@@ -3977,7 +3977,7 @@
               <a:pPr algn="ctr"/>
               <a:t>‹#›</a:t>
             </a:fld>
-            <a:endParaRPr lang="en-US" sz="1800" b="1" dirty="0">
+            <a:endParaRPr lang="en-US" sz="1800" b="0" dirty="0">
               <a:solidFill>
                 <a:schemeClr val="bg1"/>
               </a:solidFill>
@@ -4577,7 +4577,7 @@
           <a:p>
             <a:pPr algn="ctr"/>
             <a:fld id="{663B4470-66D3-704F-8586-E8D8B4F9846D}" type="slidenum">
-              <a:rPr lang="en-US" sz="1800" b="1" smtClean="0">
+              <a:rPr lang="en-US" sz="1800" b="0" smtClean="0">
                 <a:solidFill>
                   <a:schemeClr val="bg1"/>
                 </a:solidFill>
@@ -4585,7 +4585,7 @@
               <a:pPr algn="ctr"/>
               <a:t>‹#›</a:t>
             </a:fld>
-            <a:endParaRPr lang="en-US" sz="1800" b="1" dirty="0">
+            <a:endParaRPr lang="en-US" sz="1800" b="0" dirty="0">
               <a:solidFill>
                 <a:schemeClr val="bg1"/>
               </a:solidFill>
@@ -5559,7 +5559,7 @@
           <a:p>
             <a:pPr algn="ctr"/>
             <a:fld id="{663B4470-66D3-704F-8586-E8D8B4F9846D}" type="slidenum">
-              <a:rPr lang="en-US" sz="1800" b="1" smtClean="0">
+              <a:rPr lang="en-US" sz="1800" b="0" smtClean="0">
                 <a:solidFill>
                   <a:schemeClr val="bg1"/>
                 </a:solidFill>
@@ -5567,7 +5567,7 @@
               <a:pPr algn="ctr"/>
               <a:t>‹#›</a:t>
             </a:fld>
-            <a:endParaRPr lang="en-US" sz="1800" b="1" dirty="0">
+            <a:endParaRPr lang="en-US" sz="1800" b="0" dirty="0">
               <a:solidFill>
                 <a:schemeClr val="bg1"/>
               </a:solidFill>
@@ -6168,7 +6168,7 @@
           <a:p>
             <a:pPr algn="ctr"/>
             <a:fld id="{663B4470-66D3-704F-8586-E8D8B4F9846D}" type="slidenum">
-              <a:rPr lang="en-US" sz="1800" b="1" smtClean="0">
+              <a:rPr lang="en-US" sz="1800" b="0" smtClean="0">
                 <a:solidFill>
                   <a:schemeClr val="bg1"/>
                 </a:solidFill>
@@ -6176,7 +6176,7 @@
               <a:pPr algn="ctr"/>
               <a:t>‹#›</a:t>
             </a:fld>
-            <a:endParaRPr lang="en-US" sz="1800" b="1" dirty="0">
+            <a:endParaRPr lang="en-US" sz="1800" b="0" dirty="0">
               <a:solidFill>
                 <a:schemeClr val="bg1"/>
               </a:solidFill>
@@ -6858,7 +6858,7 @@
           <a:p>
             <a:pPr algn="ctr"/>
             <a:fld id="{663B4470-66D3-704F-8586-E8D8B4F9846D}" type="slidenum">
-              <a:rPr lang="en-US" sz="1800" b="1" smtClean="0">
+              <a:rPr lang="en-US" sz="1800" b="0" smtClean="0">
                 <a:solidFill>
                   <a:schemeClr val="bg1"/>
                 </a:solidFill>
@@ -6866,7 +6866,7 @@
               <a:pPr algn="ctr"/>
               <a:t>‹#›</a:t>
             </a:fld>
-            <a:endParaRPr lang="en-US" sz="1800" b="1" dirty="0">
+            <a:endParaRPr lang="en-US" sz="1800" b="0" dirty="0">
               <a:solidFill>
                 <a:schemeClr val="bg1"/>
               </a:solidFill>
@@ -7279,7 +7279,7 @@
           <a:p>
             <a:pPr algn="ctr"/>
             <a:fld id="{663B4470-66D3-704F-8586-E8D8B4F9846D}" type="slidenum">
-              <a:rPr lang="en-US" sz="1800" b="1" smtClean="0">
+              <a:rPr lang="en-US" sz="1800" b="0" smtClean="0">
                 <a:solidFill>
                   <a:schemeClr val="bg1"/>
                 </a:solidFill>
@@ -7287,7 +7287,7 @@
               <a:pPr algn="ctr"/>
               <a:t>‹#›</a:t>
             </a:fld>
-            <a:endParaRPr lang="en-US" sz="1800" b="1" dirty="0">
+            <a:endParaRPr lang="en-US" sz="1800" b="0" dirty="0">
               <a:solidFill>
                 <a:schemeClr val="bg1"/>
               </a:solidFill>
@@ -9393,7 +9393,7 @@
         </p:blipFill>
         <p:spPr>
           <a:xfrm>
-            <a:off x="6132834" y="4479553"/>
+            <a:off x="7090774" y="4479553"/>
             <a:ext cx="1105775" cy="795825"/>
           </a:xfrm>
           <a:prstGeom prst="rect">
@@ -9420,7 +9420,7 @@
         </p:blipFill>
         <p:spPr>
           <a:xfrm>
-            <a:off x="1168513" y="4645705"/>
+            <a:off x="2126453" y="4645705"/>
             <a:ext cx="2085975" cy="590550"/>
           </a:xfrm>
           <a:prstGeom prst="rect">
@@ -9447,7 +9447,7 @@
         </p:blipFill>
         <p:spPr>
           <a:xfrm>
-            <a:off x="3815732" y="4319015"/>
+            <a:off x="4773672" y="4319015"/>
             <a:ext cx="1869300" cy="1243925"/>
           </a:xfrm>
           <a:prstGeom prst="rect">
@@ -9481,7 +9481,7 @@
         </p:blipFill>
         <p:spPr>
           <a:xfrm>
-            <a:off x="7984670" y="4529349"/>
+            <a:off x="8942610" y="4529349"/>
             <a:ext cx="1143000" cy="685800"/>
           </a:xfrm>
           <a:prstGeom prst="rect">

</xml_diff>